<commit_message>
feat: SHAP and LIME analysis
</commit_message>
<xml_diff>
--- a/Predicting Survival- Machine Learning Insights from the Titanic Disaster.pptx
+++ b/Predicting Survival- Machine Learning Insights from the Titanic Disaster.pptx
@@ -5,15 +5,16 @@
     <p:sldMasterId id="2147483648" r:id="rId1"/>
   </p:sldMasterIdLst>
   <p:notesMasterIdLst>
-    <p:notesMasterId r:id="rId8"/>
+    <p:notesMasterId r:id="rId9"/>
   </p:notesMasterIdLst>
   <p:sldIdLst>
     <p:sldId id="256" r:id="rId2"/>
     <p:sldId id="257" r:id="rId3"/>
     <p:sldId id="258" r:id="rId4"/>
-    <p:sldId id="259" r:id="rId5"/>
-    <p:sldId id="260" r:id="rId6"/>
-    <p:sldId id="261" r:id="rId7"/>
+    <p:sldId id="262" r:id="rId5"/>
+    <p:sldId id="259" r:id="rId6"/>
+    <p:sldId id="260" r:id="rId7"/>
+    <p:sldId id="261" r:id="rId8"/>
   </p:sldIdLst>
   <p:sldSz cx="12192000" cy="6858000"/>
   <p:notesSz cx="6858000" cy="9144000"/>
@@ -202,7 +203,7 @@
           <a:p>
             <a:fld id="{727001A9-DC28-B94C-8861-2F23D089AEF3}" type="datetimeFigureOut">
               <a:rPr lang="en-US" smtClean="0"/>
-              <a:t>8/27/25</a:t>
+              <a:t>9/2/25</a:t>
             </a:fld>
             <a:endParaRPr lang="en-US"/>
           </a:p>
@@ -497,6 +498,13 @@
           </p:nvPr>
         </p:nvSpPr>
         <p:spPr/>
+        <p:txBody>
+          <a:bodyPr/>
+          <a:lstStyle/>
+          <a:p>
+            <a:endParaRPr lang="en-US"/>
+          </a:p>
+        </p:txBody>
       </p:sp>
       <p:sp>
         <p:nvSpPr>
@@ -581,6 +589,13 @@
           </p:nvPr>
         </p:nvSpPr>
         <p:spPr/>
+        <p:txBody>
+          <a:bodyPr/>
+          <a:lstStyle/>
+          <a:p>
+            <a:endParaRPr lang="en-US"/>
+          </a:p>
+        </p:txBody>
       </p:sp>
       <p:sp>
         <p:nvSpPr>
@@ -665,6 +680,13 @@
           </p:nvPr>
         </p:nvSpPr>
         <p:spPr/>
+        <p:txBody>
+          <a:bodyPr/>
+          <a:lstStyle/>
+          <a:p>
+            <a:endParaRPr lang="en-US"/>
+          </a:p>
+        </p:txBody>
       </p:sp>
       <p:sp>
         <p:nvSpPr>
@@ -795,7 +817,7 @@
     </p:spTree>
     <p:extLst>
       <p:ext uri="{BB962C8B-B14F-4D97-AF65-F5344CB8AC3E}">
-        <p14:creationId xmlns:p14="http://schemas.microsoft.com/office/powerpoint/2010/main" val="3742225754"/>
+        <p14:creationId xmlns:p14="http://schemas.microsoft.com/office/powerpoint/2010/main" val="2716128527"/>
       </p:ext>
     </p:extLst>
   </p:cSld>
@@ -833,6 +855,13 @@
           </p:nvPr>
         </p:nvSpPr>
         <p:spPr/>
+        <p:txBody>
+          <a:bodyPr/>
+          <a:lstStyle/>
+          <a:p>
+            <a:endParaRPr lang="en-US"/>
+          </a:p>
+        </p:txBody>
       </p:sp>
       <p:sp>
         <p:nvSpPr>
@@ -870,7 +899,98 @@
           <a:p>
             <a:fld id="{44A5313D-F558-7B47-9A6D-BB585090D48C}" type="slidenum">
               <a:rPr lang="en-US" smtClean="0"/>
-              <a:t>6</a:t>
+              <a:t>5</a:t>
+            </a:fld>
+            <a:endParaRPr lang="en-US"/>
+          </a:p>
+        </p:txBody>
+      </p:sp>
+    </p:spTree>
+    <p:extLst>
+      <p:ext uri="{BB962C8B-B14F-4D97-AF65-F5344CB8AC3E}">
+        <p14:creationId xmlns:p14="http://schemas.microsoft.com/office/powerpoint/2010/main" val="3742225754"/>
+      </p:ext>
+    </p:extLst>
+  </p:cSld>
+  <p:clrMapOvr>
+    <a:masterClrMapping/>
+  </p:clrMapOvr>
+</p:notes>
+</file>
+
+<file path=ppt/notesSlides/notesSlide6.xml><?xml version="1.0" encoding="utf-8"?>
+<p:notes xmlns:a="http://schemas.openxmlformats.org/drawingml/2006/main" xmlns:r="http://schemas.openxmlformats.org/officeDocument/2006/relationships" xmlns:p="http://schemas.openxmlformats.org/presentationml/2006/main">
+  <p:cSld>
+    <p:spTree>
+      <p:nvGrpSpPr>
+        <p:cNvPr id="1" name=""/>
+        <p:cNvGrpSpPr/>
+        <p:nvPr/>
+      </p:nvGrpSpPr>
+      <p:grpSpPr>
+        <a:xfrm>
+          <a:off x="0" y="0"/>
+          <a:ext cx="0" cy="0"/>
+          <a:chOff x="0" y="0"/>
+          <a:chExt cx="0" cy="0"/>
+        </a:xfrm>
+      </p:grpSpPr>
+      <p:sp>
+        <p:nvSpPr>
+          <p:cNvPr id="2" name="Slide Image Placeholder 1"/>
+          <p:cNvSpPr>
+            <a:spLocks noGrp="1" noRot="1" noChangeAspect="1"/>
+          </p:cNvSpPr>
+          <p:nvPr>
+            <p:ph type="sldImg"/>
+          </p:nvPr>
+        </p:nvSpPr>
+        <p:spPr/>
+        <p:txBody>
+          <a:bodyPr/>
+          <a:lstStyle/>
+          <a:p>
+            <a:endParaRPr lang="en-US"/>
+          </a:p>
+        </p:txBody>
+      </p:sp>
+      <p:sp>
+        <p:nvSpPr>
+          <p:cNvPr id="3" name="Notes Placeholder 2"/>
+          <p:cNvSpPr>
+            <a:spLocks noGrp="1"/>
+          </p:cNvSpPr>
+          <p:nvPr>
+            <p:ph type="body" idx="1"/>
+          </p:nvPr>
+        </p:nvSpPr>
+        <p:spPr/>
+        <p:txBody>
+          <a:bodyPr/>
+          <a:lstStyle/>
+          <a:p>
+            <a:endParaRPr lang="en-US" dirty="0"/>
+          </a:p>
+        </p:txBody>
+      </p:sp>
+      <p:sp>
+        <p:nvSpPr>
+          <p:cNvPr id="4" name="Slide Number Placeholder 3"/>
+          <p:cNvSpPr>
+            <a:spLocks noGrp="1"/>
+          </p:cNvSpPr>
+          <p:nvPr>
+            <p:ph type="sldNum" sz="quarter" idx="5"/>
+          </p:nvPr>
+        </p:nvSpPr>
+        <p:spPr/>
+        <p:txBody>
+          <a:bodyPr/>
+          <a:lstStyle/>
+          <a:p>
+            <a:fld id="{44A5313D-F558-7B47-9A6D-BB585090D48C}" type="slidenum">
+              <a:rPr lang="en-US" smtClean="0"/>
+              <a:t>7</a:t>
             </a:fld>
             <a:endParaRPr lang="en-US"/>
           </a:p>
@@ -1036,7 +1156,7 @@
           <a:p>
             <a:fld id="{13CA9677-4853-B742-86ED-BFB3FCE374B6}" type="datetimeFigureOut">
               <a:rPr lang="en-US" smtClean="0"/>
-              <a:t>8/27/25</a:t>
+              <a:t>9/2/25</a:t>
             </a:fld>
             <a:endParaRPr lang="en-US"/>
           </a:p>
@@ -1234,7 +1354,7 @@
           <a:p>
             <a:fld id="{13CA9677-4853-B742-86ED-BFB3FCE374B6}" type="datetimeFigureOut">
               <a:rPr lang="en-US" smtClean="0"/>
-              <a:t>8/27/25</a:t>
+              <a:t>9/2/25</a:t>
             </a:fld>
             <a:endParaRPr lang="en-US"/>
           </a:p>
@@ -1442,7 +1562,7 @@
           <a:p>
             <a:fld id="{13CA9677-4853-B742-86ED-BFB3FCE374B6}" type="datetimeFigureOut">
               <a:rPr lang="en-US" smtClean="0"/>
-              <a:t>8/27/25</a:t>
+              <a:t>9/2/25</a:t>
             </a:fld>
             <a:endParaRPr lang="en-US"/>
           </a:p>
@@ -1640,7 +1760,7 @@
           <a:p>
             <a:fld id="{13CA9677-4853-B742-86ED-BFB3FCE374B6}" type="datetimeFigureOut">
               <a:rPr lang="en-US" smtClean="0"/>
-              <a:t>8/27/25</a:t>
+              <a:t>9/2/25</a:t>
             </a:fld>
             <a:endParaRPr lang="en-US"/>
           </a:p>
@@ -1915,7 +2035,7 @@
           <a:p>
             <a:fld id="{13CA9677-4853-B742-86ED-BFB3FCE374B6}" type="datetimeFigureOut">
               <a:rPr lang="en-US" smtClean="0"/>
-              <a:t>8/27/25</a:t>
+              <a:t>9/2/25</a:t>
             </a:fld>
             <a:endParaRPr lang="en-US"/>
           </a:p>
@@ -2180,7 +2300,7 @@
           <a:p>
             <a:fld id="{13CA9677-4853-B742-86ED-BFB3FCE374B6}" type="datetimeFigureOut">
               <a:rPr lang="en-US" smtClean="0"/>
-              <a:t>8/27/25</a:t>
+              <a:t>9/2/25</a:t>
             </a:fld>
             <a:endParaRPr lang="en-US"/>
           </a:p>
@@ -2592,7 +2712,7 @@
           <a:p>
             <a:fld id="{13CA9677-4853-B742-86ED-BFB3FCE374B6}" type="datetimeFigureOut">
               <a:rPr lang="en-US" smtClean="0"/>
-              <a:t>8/27/25</a:t>
+              <a:t>9/2/25</a:t>
             </a:fld>
             <a:endParaRPr lang="en-US"/>
           </a:p>
@@ -2733,7 +2853,7 @@
           <a:p>
             <a:fld id="{13CA9677-4853-B742-86ED-BFB3FCE374B6}" type="datetimeFigureOut">
               <a:rPr lang="en-US" smtClean="0"/>
-              <a:t>8/27/25</a:t>
+              <a:t>9/2/25</a:t>
             </a:fld>
             <a:endParaRPr lang="en-US"/>
           </a:p>
@@ -2846,7 +2966,7 @@
           <a:p>
             <a:fld id="{13CA9677-4853-B742-86ED-BFB3FCE374B6}" type="datetimeFigureOut">
               <a:rPr lang="en-US" smtClean="0"/>
-              <a:t>8/27/25</a:t>
+              <a:t>9/2/25</a:t>
             </a:fld>
             <a:endParaRPr lang="en-US"/>
           </a:p>
@@ -3157,7 +3277,7 @@
           <a:p>
             <a:fld id="{13CA9677-4853-B742-86ED-BFB3FCE374B6}" type="datetimeFigureOut">
               <a:rPr lang="en-US" smtClean="0"/>
-              <a:t>8/27/25</a:t>
+              <a:t>9/2/25</a:t>
             </a:fld>
             <a:endParaRPr lang="en-US"/>
           </a:p>
@@ -3445,7 +3565,7 @@
           <a:p>
             <a:fld id="{13CA9677-4853-B742-86ED-BFB3FCE374B6}" type="datetimeFigureOut">
               <a:rPr lang="en-US" smtClean="0"/>
-              <a:t>8/27/25</a:t>
+              <a:t>9/2/25</a:t>
             </a:fld>
             <a:endParaRPr lang="en-US"/>
           </a:p>
@@ -3686,7 +3806,7 @@
           <a:p>
             <a:fld id="{13CA9677-4853-B742-86ED-BFB3FCE374B6}" type="datetimeFigureOut">
               <a:rPr lang="en-US" smtClean="0"/>
-              <a:t>8/27/25</a:t>
+              <a:t>9/2/25</a:t>
             </a:fld>
             <a:endParaRPr lang="en-US"/>
           </a:p>
@@ -4978,7 +5098,7 @@
         </p:nvSpPr>
         <p:spPr>
           <a:xfrm>
-            <a:off x="7451748" y="3105834"/>
+            <a:off x="7723211" y="2008694"/>
             <a:ext cx="3371930" cy="646331"/>
           </a:xfrm>
           <a:prstGeom prst="rect">
@@ -5029,10 +5149,10 @@
       </p:sp>
       <p:sp>
         <p:nvSpPr>
-          <p:cNvPr id="6" name="TextBox 5">
-            <a:extLst>
-              <a:ext uri="{FF2B5EF4-FFF2-40B4-BE49-F238E27FC236}">
-                <a16:creationId xmlns:a16="http://schemas.microsoft.com/office/drawing/2014/main" id="{95D5B598-C55A-9602-D595-70BFB8178A52}"/>
+          <p:cNvPr id="3" name="TextBox 2">
+            <a:extLst>
+              <a:ext uri="{FF2B5EF4-FFF2-40B4-BE49-F238E27FC236}">
+                <a16:creationId xmlns:a16="http://schemas.microsoft.com/office/drawing/2014/main" id="{9E55E7E9-C87B-4C36-8EE9-20EC01F04D3D}"/>
               </a:ext>
             </a:extLst>
           </p:cNvPr>
@@ -5041,13 +5161,17 @@
         </p:nvSpPr>
         <p:spPr>
           <a:xfrm>
-            <a:off x="7451748" y="4088228"/>
-            <a:ext cx="4288803" cy="1200329"/>
+            <a:off x="7723211" y="3429000"/>
+            <a:ext cx="3371930" cy="2585323"/>
           </a:xfrm>
           <a:prstGeom prst="rect">
             <a:avLst/>
           </a:prstGeom>
-          <a:noFill/>
+          <a:solidFill>
+            <a:srgbClr val="FFFF00">
+              <a:alpha val="19000"/>
+            </a:srgbClr>
+          </a:solidFill>
         </p:spPr>
         <p:txBody>
           <a:bodyPr wrap="square" rtlCol="0">
@@ -5057,21 +5181,7 @@
           <a:p>
             <a:r>
               <a:rPr lang="en-US" dirty="0"/>
-              <a:t>TODO: Define</a:t>
-            </a:r>
-            <a:br>
-              <a:rPr lang="en-US" dirty="0"/>
-            </a:br>
-            <a:r>
-              <a:rPr lang="en-US" dirty="0"/>
-              <a:t>Model:</a:t>
-            </a:r>
-            <a:br>
-              <a:rPr lang="en-US" dirty="0"/>
-            </a:br>
-            <a:r>
-              <a:rPr lang="en-US" dirty="0"/>
-              <a:t>Variable: Do things like family size and social status affect survival rate?</a:t>
+              <a:t>A machine learning model is a computer program that learns patterns from historical data to make predictions about new situations. Think of it as a very sophisticated calculator that can recognize complex patterns and apply them to make informed guesses.</a:t>
             </a:r>
           </a:p>
         </p:txBody>
@@ -5152,8 +5262,8 @@
         </p:nvSpPr>
         <p:spPr>
           <a:xfrm>
-            <a:off x="6248400" y="1978025"/>
-            <a:ext cx="5257800" cy="4351338"/>
+            <a:off x="6958012" y="1978025"/>
+            <a:ext cx="4548187" cy="4351338"/>
           </a:xfrm>
         </p:spPr>
         <p:txBody>
@@ -5204,8 +5314,8 @@
         </p:nvSpPr>
         <p:spPr>
           <a:xfrm>
-            <a:off x="990600" y="1978025"/>
-            <a:ext cx="5257800" cy="4351338"/>
+            <a:off x="990600" y="1690688"/>
+            <a:ext cx="5653088" cy="4938712"/>
           </a:xfrm>
           <a:prstGeom prst="rect">
             <a:avLst/>
@@ -5213,7 +5323,7 @@
         </p:spPr>
         <p:txBody>
           <a:bodyPr vert="horz" lIns="91440" tIns="45720" rIns="91440" bIns="45720" rtlCol="0">
-            <a:normAutofit lnSpcReduction="10000"/>
+            <a:normAutofit fontScale="92500" lnSpcReduction="10000"/>
           </a:bodyPr>
           <a:lstStyle>
             <a:lvl1pPr marL="228600" indent="-228600" algn="l" defTabSz="914400" rtl="0" eaLnBrk="1" latinLnBrk="0" hangingPunct="1">
@@ -5393,16 +5503,12 @@
               <a:buNone/>
             </a:pPr>
             <a:r>
-              <a:rPr lang="en-US" sz="1900" b="1" dirty="0"/>
-              <a:t>1</a:t>
-            </a:r>
-            <a:r>
               <a:rPr lang="en-US" sz="2200" b="1" dirty="0"/>
-              <a:t>. Gender:</a:t>
+              <a:t>1. Gender:</a:t>
             </a:r>
             <a:r>
               <a:rPr lang="en-US" sz="2200" dirty="0"/>
-              <a:t> Women 4x more likely to survive [GOOD]</a:t>
+              <a:t> Women 4x more likely to survive</a:t>
             </a:r>
           </a:p>
           <a:p>
@@ -5415,7 +5521,7 @@
             </a:r>
             <a:r>
               <a:rPr lang="en-US" sz="2200" dirty="0"/>
-              <a:t> Wealth = access to lifeboats [GOOD]</a:t>
+              <a:t> Wealth = access to lifeboats</a:t>
             </a:r>
           </a:p>
           <a:p>
@@ -5428,7 +5534,25 @@
             </a:r>
             <a:r>
               <a:rPr lang="en-US" sz="2200" dirty="0"/>
-              <a:t> Children prioritized for rescue [TODO: Explain]</a:t>
+              <a:t> Children prioritized for rescue </a:t>
+            </a:r>
+          </a:p>
+          <a:p>
+            <a:pPr marL="0" indent="0">
+              <a:buNone/>
+            </a:pPr>
+            <a:r>
+              <a:rPr lang="en-US" sz="2200" dirty="0"/>
+              <a:t>Children &lt;12: 54% survival vs adults 38% </a:t>
+            </a:r>
+          </a:p>
+          <a:p>
+            <a:pPr marL="0" indent="0">
+              <a:buNone/>
+            </a:pPr>
+            <a:r>
+              <a:rPr lang="en-US" sz="2200" dirty="0"/>
+              <a:t>Even boys (58%) survived better than men (17%)</a:t>
             </a:r>
           </a:p>
           <a:p>
@@ -5441,7 +5565,7 @@
             </a:r>
             <a:r>
               <a:rPr lang="en-US" sz="2200" dirty="0"/>
-              <a:t> Small families (2-4) optimal TODO: Explain</a:t>
+              <a:t> Small families (2-4) optimal </a:t>
             </a:r>
           </a:p>
           <a:p>
@@ -5454,7 +5578,34 @@
             </a:r>
             <a:r>
               <a:rPr lang="en-US" sz="2200" dirty="0"/>
-              <a:t> Title reveals survival chances [TODO: Explain]. There are some exceptions to that rule – the richest person died</a:t>
+              <a:t> Survival chances based on title is convoluted</a:t>
+            </a:r>
+          </a:p>
+          <a:p>
+            <a:pPr marL="0" indent="0">
+              <a:buNone/>
+            </a:pPr>
+            <a:r>
+              <a:rPr lang="en-US" sz="2200" dirty="0"/>
+              <a:t>"Mr." = 16% (adult male, last priority) </a:t>
+            </a:r>
+          </a:p>
+          <a:p>
+            <a:pPr marL="0" indent="0">
+              <a:buNone/>
+            </a:pPr>
+            <a:r>
+              <a:rPr lang="en-US" sz="2200" dirty="0"/>
+              <a:t>"Mrs./Miss" = 74% (female, first priority) </a:t>
+            </a:r>
+          </a:p>
+          <a:p>
+            <a:pPr marL="0" indent="0">
+              <a:buNone/>
+            </a:pPr>
+            <a:r>
+              <a:rPr lang="en-US" sz="2200" dirty="0"/>
+              <a:t>Exception: Wealthy men still died - gender trumped class</a:t>
             </a:r>
           </a:p>
         </p:txBody>
@@ -5505,7 +5656,7 @@
         </p:nvSpPr>
         <p:spPr>
           <a:xfrm>
-            <a:off x="7291568" y="4153694"/>
+            <a:off x="6958012" y="4453731"/>
             <a:ext cx="3171463" cy="1107996"/>
           </a:xfrm>
           <a:prstGeom prst="rect">
@@ -5566,46 +5717,6 @@
           </a:p>
         </p:txBody>
       </p:sp>
-      <p:sp>
-        <p:nvSpPr>
-          <p:cNvPr id="7" name="TextBox 6">
-            <a:extLst>
-              <a:ext uri="{FF2B5EF4-FFF2-40B4-BE49-F238E27FC236}">
-                <a16:creationId xmlns:a16="http://schemas.microsoft.com/office/drawing/2014/main" id="{91E6DA28-34B8-DEB7-CCC0-B4067A54DD1F}"/>
-              </a:ext>
-            </a:extLst>
-          </p:cNvPr>
-          <p:cNvSpPr txBox="1"/>
-          <p:nvPr/>
-        </p:nvSpPr>
-        <p:spPr>
-          <a:xfrm>
-            <a:off x="6864038" y="5902560"/>
-            <a:ext cx="1946302" cy="369332"/>
-          </a:xfrm>
-          <a:prstGeom prst="rect">
-            <a:avLst/>
-          </a:prstGeom>
-          <a:noFill/>
-        </p:spPr>
-        <p:txBody>
-          <a:bodyPr wrap="none" rtlCol="0">
-            <a:spAutoFit/>
-          </a:bodyPr>
-          <a:lstStyle/>
-          <a:p>
-            <a:r>
-              <a:rPr lang="en-US" dirty="0"/>
-              <a:t>TODO: Lime/</a:t>
-            </a:r>
-            <a:r>
-              <a:rPr lang="en-US" dirty="0" err="1"/>
-              <a:t>shap</a:t>
-            </a:r>
-            <a:endParaRPr lang="en-US" dirty="0"/>
-          </a:p>
-        </p:txBody>
-      </p:sp>
     </p:spTree>
     <p:extLst>
       <p:ext uri="{BB962C8B-B14F-4D97-AF65-F5344CB8AC3E}">
@@ -5641,6 +5752,194 @@
           <p:cNvPr id="2" name="Title 1">
             <a:extLst>
               <a:ext uri="{FF2B5EF4-FFF2-40B4-BE49-F238E27FC236}">
+                <a16:creationId xmlns:a16="http://schemas.microsoft.com/office/drawing/2014/main" id="{964F8B9D-AEEC-8C99-4017-0B77AC2BB911}"/>
+              </a:ext>
+            </a:extLst>
+          </p:cNvPr>
+          <p:cNvSpPr>
+            <a:spLocks noGrp="1"/>
+          </p:cNvSpPr>
+          <p:nvPr>
+            <p:ph type="title"/>
+          </p:nvPr>
+        </p:nvSpPr>
+        <p:spPr/>
+        <p:txBody>
+          <a:bodyPr/>
+          <a:lstStyle/>
+          <a:p>
+            <a:r>
+              <a:rPr lang="en-US" dirty="0"/>
+              <a:t>Deeper Insights</a:t>
+            </a:r>
+          </a:p>
+        </p:txBody>
+      </p:sp>
+      <p:sp>
+        <p:nvSpPr>
+          <p:cNvPr id="3" name="Content Placeholder 2">
+            <a:extLst>
+              <a:ext uri="{FF2B5EF4-FFF2-40B4-BE49-F238E27FC236}">
+                <a16:creationId xmlns:a16="http://schemas.microsoft.com/office/drawing/2014/main" id="{0178F194-3C19-D5A2-DAED-F61568EB4C24}"/>
+              </a:ext>
+            </a:extLst>
+          </p:cNvPr>
+          <p:cNvSpPr>
+            <a:spLocks noGrp="1"/>
+          </p:cNvSpPr>
+          <p:nvPr>
+            <p:ph idx="1"/>
+          </p:nvPr>
+        </p:nvSpPr>
+        <p:spPr>
+          <a:xfrm>
+            <a:off x="838200" y="1690688"/>
+            <a:ext cx="10515600" cy="4675189"/>
+          </a:xfrm>
+        </p:spPr>
+        <p:txBody>
+          <a:bodyPr>
+            <a:noAutofit/>
+          </a:bodyPr>
+          <a:lstStyle/>
+          <a:p>
+            <a:r>
+              <a:rPr lang="en-US" sz="2000" b="1" dirty="0"/>
+              <a:t>Family Size Impact:</a:t>
+            </a:r>
+          </a:p>
+          <a:p>
+            <a:pPr lvl="1"/>
+            <a:r>
+              <a:rPr lang="en-US" sz="2000" b="1" dirty="0"/>
+              <a:t>Family size was identified as one of the top 5 most important features</a:t>
+            </a:r>
+            <a:r>
+              <a:rPr lang="en-US" sz="2000" dirty="0"/>
+              <a:t> by your GradientBoosting model</a:t>
+            </a:r>
+          </a:p>
+          <a:p>
+            <a:pPr lvl="1"/>
+            <a:r>
+              <a:rPr lang="en-US" sz="2000" b="1" dirty="0"/>
+              <a:t>Optimal family size for survival was 2-4 people</a:t>
+            </a:r>
+            <a:r>
+              <a:rPr lang="en-US" sz="2000" dirty="0"/>
+              <a:t> - not traveling alone, but not in very large groups</a:t>
+            </a:r>
+          </a:p>
+          <a:p>
+            <a:pPr lvl="1"/>
+            <a:r>
+              <a:rPr lang="en-US" sz="2000" dirty="0"/>
+              <a:t>Alone (30%): No help finding lifeboats </a:t>
+            </a:r>
+          </a:p>
+          <a:p>
+            <a:pPr lvl="1"/>
+            <a:r>
+              <a:rPr lang="en-US" sz="2000" dirty="0"/>
+              <a:t>Small (55%): Could stay together, mutual aid </a:t>
+            </a:r>
+          </a:p>
+          <a:p>
+            <a:pPr lvl="1"/>
+            <a:r>
+              <a:rPr lang="en-US" sz="2000" dirty="0"/>
+              <a:t>Large (16%): Too hard to coordinate, keep together</a:t>
+            </a:r>
+          </a:p>
+          <a:p>
+            <a:r>
+              <a:rPr lang="en-US" sz="2000" b="1" dirty="0"/>
+              <a:t>Social Status Impact:</a:t>
+            </a:r>
+          </a:p>
+          <a:p>
+            <a:pPr lvl="1"/>
+            <a:r>
+              <a:rPr lang="en-US" sz="2000" b="1" dirty="0"/>
+              <a:t>Passenger class (Pclass) was a critical predictor</a:t>
+            </a:r>
+            <a:r>
+              <a:rPr lang="en-US" sz="2000" dirty="0"/>
+              <a:t> - directly indicating social status</a:t>
+            </a:r>
+          </a:p>
+          <a:p>
+            <a:pPr lvl="1"/>
+            <a:r>
+              <a:rPr lang="en-US" sz="2000" b="1" dirty="0"/>
+              <a:t>1st class: 62.9% survival rate</a:t>
+            </a:r>
+            <a:endParaRPr lang="en-US" sz="2000" dirty="0"/>
+          </a:p>
+          <a:p>
+            <a:pPr lvl="1"/>
+            <a:r>
+              <a:rPr lang="en-US" sz="2000" b="1" dirty="0"/>
+              <a:t>2nd class: 47.3% survival rate</a:t>
+            </a:r>
+            <a:endParaRPr lang="en-US" sz="2000" dirty="0"/>
+          </a:p>
+          <a:p>
+            <a:pPr lvl="1"/>
+            <a:r>
+              <a:rPr lang="en-US" sz="2000" b="1" dirty="0"/>
+              <a:t>3rd class: 24.2% survival rate</a:t>
+            </a:r>
+            <a:endParaRPr lang="en-US" sz="2000" dirty="0"/>
+          </a:p>
+          <a:p>
+            <a:pPr lvl="1"/>
+            <a:r>
+              <a:rPr lang="en-US" sz="2000" b="1" dirty="0"/>
+              <a:t>Fare amount</a:t>
+            </a:r>
+            <a:r>
+              <a:rPr lang="en-US" sz="2000" dirty="0"/>
+              <a:t> (proxy for wealth) was the 3rd most important feature</a:t>
+            </a:r>
+          </a:p>
+        </p:txBody>
+      </p:sp>
+    </p:spTree>
+    <p:extLst>
+      <p:ext uri="{BB962C8B-B14F-4D97-AF65-F5344CB8AC3E}">
+        <p14:creationId xmlns:p14="http://schemas.microsoft.com/office/powerpoint/2010/main" val="3014202945"/>
+      </p:ext>
+    </p:extLst>
+  </p:cSld>
+  <p:clrMapOvr>
+    <a:masterClrMapping/>
+  </p:clrMapOvr>
+</p:sld>
+</file>
+
+<file path=ppt/slides/slide5.xml><?xml version="1.0" encoding="utf-8"?>
+<p:sld xmlns:a="http://schemas.openxmlformats.org/drawingml/2006/main" xmlns:r="http://schemas.openxmlformats.org/officeDocument/2006/relationships" xmlns:p="http://schemas.openxmlformats.org/presentationml/2006/main">
+  <p:cSld>
+    <p:spTree>
+      <p:nvGrpSpPr>
+        <p:cNvPr id="1" name=""/>
+        <p:cNvGrpSpPr/>
+        <p:nvPr/>
+      </p:nvGrpSpPr>
+      <p:grpSpPr>
+        <a:xfrm>
+          <a:off x="0" y="0"/>
+          <a:ext cx="0" cy="0"/>
+          <a:chOff x="0" y="0"/>
+          <a:chExt cx="0" cy="0"/>
+        </a:xfrm>
+      </p:grpSpPr>
+      <p:sp>
+        <p:nvSpPr>
+          <p:cNvPr id="2" name="Title 1">
+            <a:extLst>
+              <a:ext uri="{FF2B5EF4-FFF2-40B4-BE49-F238E27FC236}">
                 <a16:creationId xmlns:a16="http://schemas.microsoft.com/office/drawing/2014/main" id="{53F5FB73-1096-9725-0934-7287D3FB5439}"/>
               </a:ext>
             </a:extLst>
@@ -5682,8 +5981,8 @@
         </p:nvSpPr>
         <p:spPr>
           <a:xfrm>
-            <a:off x="838200" y="1825625"/>
-            <a:ext cx="3988443" cy="1603375"/>
+            <a:off x="838200" y="1825626"/>
+            <a:ext cx="4791075" cy="3017838"/>
           </a:xfrm>
           <a:gradFill>
             <a:gsLst>
@@ -5716,7 +6015,9 @@
           </a:gradFill>
         </p:spPr>
         <p:txBody>
-          <a:bodyPr/>
+          <a:bodyPr lIns="182880" tIns="182880" rIns="182880" bIns="182880">
+            <a:normAutofit fontScale="70000" lnSpcReduction="20000"/>
+          </a:bodyPr>
           <a:lstStyle/>
           <a:p>
             <a:r>
@@ -5725,9 +6026,37 @@
             </a:r>
           </a:p>
           <a:p>
+            <a:pPr lvl="1"/>
+            <a:r>
+              <a:rPr lang="en-US" dirty="0"/>
+              <a:t>Out of 100 passengers, model correctly predicts survival for 79</a:t>
+            </a:r>
+          </a:p>
+          <a:p>
+            <a:pPr lvl="1"/>
+            <a:r>
+              <a:rPr lang="en-US" dirty="0"/>
+              <a:t>Calculated on 20% holdout data never seen during training</a:t>
+            </a:r>
+          </a:p>
+          <a:p>
             <a:r>
               <a:rPr lang="en-US" dirty="0"/>
               <a:t>Kaggle Score: 77.3%</a:t>
+            </a:r>
+          </a:p>
+          <a:p>
+            <a:pPr lvl="1"/>
+            <a:r>
+              <a:rPr lang="en-US" dirty="0"/>
+              <a:t>Real-world test on completely unseen data (418 passengers)</a:t>
+            </a:r>
+          </a:p>
+          <a:p>
+            <a:pPr lvl="1"/>
+            <a:r>
+              <a:rPr lang="en-US" dirty="0"/>
+              <a:t>Lower than test accuracy is normal - this is the true performance</a:t>
             </a:r>
           </a:p>
           <a:p>
@@ -6214,62 +6543,58 @@
         </p:nvSpPr>
         <p:spPr>
           <a:xfrm>
-            <a:off x="733245" y="3630553"/>
-            <a:ext cx="4330461" cy="2862322"/>
+            <a:off x="838200" y="5112235"/>
+            <a:ext cx="4330461" cy="923330"/>
           </a:xfrm>
           <a:prstGeom prst="rect">
             <a:avLst/>
           </a:prstGeom>
-          <a:noFill/>
+          <a:gradFill flip="none" rotWithShape="1">
+            <a:gsLst>
+              <a:gs pos="0">
+                <a:schemeClr val="accent6">
+                  <a:lumMod val="5000"/>
+                  <a:lumOff val="95000"/>
+                </a:schemeClr>
+              </a:gs>
+              <a:gs pos="74000">
+                <a:schemeClr val="accent6">
+                  <a:lumMod val="45000"/>
+                  <a:lumOff val="55000"/>
+                </a:schemeClr>
+              </a:gs>
+              <a:gs pos="83000">
+                <a:schemeClr val="accent6">
+                  <a:lumMod val="45000"/>
+                  <a:lumOff val="55000"/>
+                </a:schemeClr>
+              </a:gs>
+              <a:gs pos="100000">
+                <a:schemeClr val="accent6">
+                  <a:lumMod val="30000"/>
+                  <a:lumOff val="70000"/>
+                </a:schemeClr>
+              </a:gs>
+            </a:gsLst>
+            <a:lin ang="10800000" scaled="0"/>
+            <a:tileRect/>
+          </a:gradFill>
         </p:spPr>
         <p:txBody>
-          <a:bodyPr wrap="square" rtlCol="0">
+          <a:bodyPr wrap="square" lIns="182880" tIns="182880" rIns="182880" bIns="182880" rtlCol="0">
             <a:spAutoFit/>
           </a:bodyPr>
           <a:lstStyle/>
           <a:p>
             <a:r>
               <a:rPr lang="en-US" dirty="0"/>
-              <a:t>Explain </a:t>
-            </a:r>
-            <a:br>
+              <a:t>First time submission – got 77.3%!</a:t>
+            </a:r>
+          </a:p>
+          <a:p>
+            <a:r>
               <a:rPr lang="en-US" dirty="0"/>
-            </a:br>
-            <a:r>
-              <a:rPr lang="en-US" dirty="0"/>
-              <a:t>what does test accuracy mean?</a:t>
-            </a:r>
-            <a:br>
-              <a:rPr lang="en-US" dirty="0"/>
-            </a:br>
-            <a:r>
-              <a:rPr lang="en-US" dirty="0"/>
-              <a:t>Kaggle score?</a:t>
-            </a:r>
-            <a:br>
-              <a:rPr lang="en-US" dirty="0"/>
-            </a:br>
-            <a:r>
-              <a:rPr lang="en-US" dirty="0"/>
-              <a:t>F1 score?</a:t>
-            </a:r>
-          </a:p>
-          <a:p>
-            <a:endParaRPr lang="en-US" dirty="0"/>
-          </a:p>
-          <a:p>
-            <a:r>
-              <a:rPr lang="en-US" dirty="0"/>
-              <a:t>First time submission – got 77.3%!</a:t>
-            </a:r>
-          </a:p>
-          <a:p>
-            <a:endParaRPr lang="en-US" dirty="0"/>
-          </a:p>
-          <a:p>
-            <a:r>
-              <a:rPr lang="en-US" dirty="0"/>
-              <a:t>If I could find someone else’s submission up around a 1 to see why they got a 1?? F1 or accuracy score was very high?</a:t>
+              <a:t>Top 30-40% on leaderboard</a:t>
             </a:r>
           </a:p>
         </p:txBody>
@@ -6287,7 +6612,7 @@
 </p:sld>
 </file>
 
-<file path=ppt/slides/slide5.xml><?xml version="1.0" encoding="utf-8"?>
+<file path=ppt/slides/slide6.xml><?xml version="1.0" encoding="utf-8"?>
 <p:sld xmlns:a="http://schemas.openxmlformats.org/drawingml/2006/main" xmlns:r="http://schemas.openxmlformats.org/officeDocument/2006/relationships" xmlns:p="http://schemas.openxmlformats.org/presentationml/2006/main">
   <p:cSld>
     <p:spTree>
@@ -6509,7 +6834,7 @@
 </p:sld>
 </file>
 
-<file path=ppt/slides/slide6.xml><?xml version="1.0" encoding="utf-8"?>
+<file path=ppt/slides/slide7.xml><?xml version="1.0" encoding="utf-8"?>
 <p:sld xmlns:a="http://schemas.openxmlformats.org/drawingml/2006/main" xmlns:r="http://schemas.openxmlformats.org/officeDocument/2006/relationships" xmlns:p="http://schemas.openxmlformats.org/presentationml/2006/main">
   <p:cSld>
     <p:spTree>
@@ -6657,8 +6982,8 @@
         </p:nvSpPr>
         <p:spPr>
           <a:xfrm>
-            <a:off x="7187879" y="2828835"/>
-            <a:ext cx="3495554" cy="1200329"/>
+            <a:off x="7401047" y="1825625"/>
+            <a:ext cx="3171704" cy="1754326"/>
           </a:xfrm>
           <a:prstGeom prst="rect">
             <a:avLst/>
@@ -6711,10 +7036,52 @@
             </a:r>
           </a:p>
           <a:p>
-            <a:r>
-              <a:rPr lang="en-US" dirty="0"/>
-              <a:t>LINK</a:t>
-            </a:r>
+            <a:endParaRPr lang="en-US" dirty="0"/>
+          </a:p>
+          <a:p>
+            <a:r>
+              <a:rPr lang="en-US" dirty="0">
+                <a:hlinkClick r:id="rId3"/>
+              </a:rPr>
+              <a:t>https://</a:t>
+            </a:r>
+            <a:r>
+              <a:rPr lang="en-US" dirty="0" err="1">
+                <a:hlinkClick r:id="rId3"/>
+              </a:rPr>
+              <a:t>github.com</a:t>
+            </a:r>
+            <a:r>
+              <a:rPr lang="en-US" dirty="0">
+                <a:hlinkClick r:id="rId3"/>
+              </a:rPr>
+              <a:t>/</a:t>
+            </a:r>
+            <a:r>
+              <a:rPr lang="en-US" dirty="0" err="1">
+                <a:hlinkClick r:id="rId3"/>
+              </a:rPr>
+              <a:t>angelacyu</a:t>
+            </a:r>
+            <a:r>
+              <a:rPr lang="en-US" dirty="0">
+                <a:hlinkClick r:id="rId3"/>
+              </a:rPr>
+              <a:t>/titanic-</a:t>
+            </a:r>
+            <a:r>
+              <a:rPr lang="en-US" dirty="0" err="1">
+                <a:hlinkClick r:id="rId3"/>
+              </a:rPr>
+              <a:t>kaggle</a:t>
+            </a:r>
+            <a:r>
+              <a:rPr lang="en-US" dirty="0">
+                <a:hlinkClick r:id="rId3"/>
+              </a:rPr>
+              <a:t>-challenge</a:t>
+            </a:r>
+            <a:endParaRPr lang="en-US" dirty="0"/>
           </a:p>
         </p:txBody>
       </p:sp>

</xml_diff>